<commit_message>
Updated lecture 17 slides
</commit_message>
<xml_diff>
--- a/lectures/17.Objectives.PSFs.pptx
+++ b/lectures/17.Objectives.PSFs.pptx
@@ -6,10 +6,10 @@
     <p:sldMasterId id="2147483660" r:id="rId2"/>
   </p:sldMasterIdLst>
   <p:notesMasterIdLst>
-    <p:notesMasterId r:id="rId26"/>
+    <p:notesMasterId r:id="rId27"/>
   </p:notesMasterIdLst>
   <p:handoutMasterIdLst>
-    <p:handoutMasterId r:id="rId27"/>
+    <p:handoutMasterId r:id="rId28"/>
   </p:handoutMasterIdLst>
   <p:sldIdLst>
     <p:sldId id="257" r:id="rId3"/>
@@ -26,15 +26,16 @@
     <p:sldId id="819" r:id="rId14"/>
     <p:sldId id="820" r:id="rId15"/>
     <p:sldId id="818" r:id="rId16"/>
-    <p:sldId id="807" r:id="rId17"/>
-    <p:sldId id="808" r:id="rId18"/>
-    <p:sldId id="809" r:id="rId19"/>
-    <p:sldId id="810" r:id="rId20"/>
-    <p:sldId id="821" r:id="rId21"/>
-    <p:sldId id="811" r:id="rId22"/>
-    <p:sldId id="778" r:id="rId23"/>
-    <p:sldId id="812" r:id="rId24"/>
-    <p:sldId id="813" r:id="rId25"/>
+    <p:sldId id="823" r:id="rId17"/>
+    <p:sldId id="807" r:id="rId18"/>
+    <p:sldId id="808" r:id="rId19"/>
+    <p:sldId id="809" r:id="rId20"/>
+    <p:sldId id="810" r:id="rId21"/>
+    <p:sldId id="821" r:id="rId22"/>
+    <p:sldId id="811" r:id="rId23"/>
+    <p:sldId id="778" r:id="rId24"/>
+    <p:sldId id="812" r:id="rId25"/>
+    <p:sldId id="813" r:id="rId26"/>
   </p:sldIdLst>
   <p:sldSz cx="9144000" cy="6858000" type="screen4x3"/>
   <p:notesSz cx="6858000" cy="9144000"/>
@@ -829,6 +830,91 @@
     </a:lvl9pPr>
   </p:notesStyle>
 </p:notesMaster>
+</file>
+
+<file path=ppt/notesSlides/notesSlide1.xml><?xml version="1.0" encoding="utf-8"?>
+<p:notes xmlns:a="http://schemas.openxmlformats.org/drawingml/2006/main" xmlns:r="http://schemas.openxmlformats.org/officeDocument/2006/relationships" xmlns:p="http://schemas.openxmlformats.org/presentationml/2006/main">
+  <p:cSld>
+    <p:spTree>
+      <p:nvGrpSpPr>
+        <p:cNvPr id="1" name=""/>
+        <p:cNvGrpSpPr/>
+        <p:nvPr/>
+      </p:nvGrpSpPr>
+      <p:grpSpPr>
+        <a:xfrm>
+          <a:off x="0" y="0"/>
+          <a:ext cx="0" cy="0"/>
+          <a:chOff x="0" y="0"/>
+          <a:chExt cx="0" cy="0"/>
+        </a:xfrm>
+      </p:grpSpPr>
+      <p:sp>
+        <p:nvSpPr>
+          <p:cNvPr id="2" name="Slide Image Placeholder 1"/>
+          <p:cNvSpPr>
+            <a:spLocks noGrp="1" noRot="1" noChangeAspect="1"/>
+          </p:cNvSpPr>
+          <p:nvPr>
+            <p:ph type="sldImg"/>
+          </p:nvPr>
+        </p:nvSpPr>
+        <p:spPr/>
+      </p:sp>
+      <p:sp>
+        <p:nvSpPr>
+          <p:cNvPr id="3" name="Notes Placeholder 2"/>
+          <p:cNvSpPr>
+            <a:spLocks noGrp="1"/>
+          </p:cNvSpPr>
+          <p:nvPr>
+            <p:ph type="body" idx="1"/>
+          </p:nvPr>
+        </p:nvSpPr>
+        <p:spPr/>
+        <p:txBody>
+          <a:bodyPr/>
+          <a:lstStyle/>
+          <a:p>
+            <a:endParaRPr lang="en-US" dirty="0"/>
+          </a:p>
+        </p:txBody>
+      </p:sp>
+      <p:sp>
+        <p:nvSpPr>
+          <p:cNvPr id="4" name="Slide Number Placeholder 3"/>
+          <p:cNvSpPr>
+            <a:spLocks noGrp="1"/>
+          </p:cNvSpPr>
+          <p:nvPr>
+            <p:ph type="sldNum" sz="quarter" idx="5"/>
+          </p:nvPr>
+        </p:nvSpPr>
+        <p:spPr/>
+        <p:txBody>
+          <a:bodyPr/>
+          <a:lstStyle/>
+          <a:p>
+            <a:fld id="{33A0D558-D351-4D83-94B2-1D2521AF4FC0}" type="slidenum">
+              <a:rPr lang="en-US" smtClean="0"/>
+              <a:pPr/>
+              <a:t>18</a:t>
+            </a:fld>
+            <a:endParaRPr lang="en-US"/>
+          </a:p>
+        </p:txBody>
+      </p:sp>
+    </p:spTree>
+    <p:extLst>
+      <p:ext uri="{BB962C8B-B14F-4D97-AF65-F5344CB8AC3E}">
+        <p14:creationId xmlns:p14="http://schemas.microsoft.com/office/powerpoint/2010/main" val="1926823148"/>
+      </p:ext>
+    </p:extLst>
+  </p:cSld>
+  <p:clrMapOvr>
+    <a:masterClrMapping/>
+  </p:clrMapOvr>
+</p:notes>
 </file>
 
 <file path=ppt/slideLayouts/slideLayout1.xml><?xml version="1.0" encoding="utf-8"?>
@@ -9956,11 +10042,22 @@
               </a:pPr>
               <a:r>
                 <a:rPr lang="en-US" sz="3200" dirty="0">
+                  <a:solidFill>
+                    <a:srgbClr val="595959"/>
+                  </a:solidFill>
                   <a:latin typeface="Helvetica Neue" panose="02000503000000020004" pitchFamily="2" charset="0"/>
                   <a:ea typeface="Helvetica Neue" panose="02000503000000020004" pitchFamily="2" charset="0"/>
                   <a:cs typeface="Helvetica Neue" panose="02000503000000020004" pitchFamily="2" charset="0"/>
                 </a:rPr>
-                <a:t>Typically 0.17 mm (#1.5)</a:t>
+                <a:t>T</a:t>
+              </a:r>
+              <a:r>
+                <a:rPr lang="en-US" sz="3200" dirty="0">
+                  <a:latin typeface="Helvetica Neue" panose="02000503000000020004" pitchFamily="2" charset="0"/>
+                  <a:ea typeface="Helvetica Neue" panose="02000503000000020004" pitchFamily="2" charset="0"/>
+                  <a:cs typeface="Helvetica Neue" panose="02000503000000020004" pitchFamily="2" charset="0"/>
+                </a:rPr>
+                <a:t>ypically 0.17 mm (#1.5)</a:t>
               </a:r>
             </a:p>
             <a:p>
@@ -10311,6 +10408,249 @@
       </p:grpSpPr>
       <p:sp>
         <p:nvSpPr>
+          <p:cNvPr id="2" name="Title 1">
+            <a:extLst>
+              <a:ext uri="{FF2B5EF4-FFF2-40B4-BE49-F238E27FC236}">
+                <a16:creationId xmlns:a16="http://schemas.microsoft.com/office/drawing/2014/main" id="{567C04B7-99DF-405C-51F8-7614911C755F}"/>
+              </a:ext>
+            </a:extLst>
+          </p:cNvPr>
+          <p:cNvSpPr>
+            <a:spLocks noGrp="1"/>
+          </p:cNvSpPr>
+          <p:nvPr>
+            <p:ph type="title"/>
+          </p:nvPr>
+        </p:nvSpPr>
+        <p:spPr/>
+        <p:txBody>
+          <a:bodyPr/>
+          <a:lstStyle/>
+          <a:p>
+            <a:r>
+              <a:rPr lang="en-US" b="1" dirty="0">
+                <a:solidFill>
+                  <a:srgbClr val="5E5E5E"/>
+                </a:solidFill>
+                <a:latin typeface="Garamond" panose="02020404030301010803" pitchFamily="18" charset="0"/>
+              </a:rPr>
+              <a:t>µCourse video on PSFs</a:t>
+            </a:r>
+          </a:p>
+        </p:txBody>
+      </p:sp>
+      <p:sp>
+        <p:nvSpPr>
+          <p:cNvPr id="4" name="Slide Number Placeholder 3">
+            <a:extLst>
+              <a:ext uri="{FF2B5EF4-FFF2-40B4-BE49-F238E27FC236}">
+                <a16:creationId xmlns:a16="http://schemas.microsoft.com/office/drawing/2014/main" id="{A47CDB49-508A-1B39-8C6F-924478DAC16B}"/>
+              </a:ext>
+            </a:extLst>
+          </p:cNvPr>
+          <p:cNvSpPr>
+            <a:spLocks noGrp="1"/>
+          </p:cNvSpPr>
+          <p:nvPr>
+            <p:ph type="sldNum" sz="quarter" idx="12"/>
+          </p:nvPr>
+        </p:nvSpPr>
+        <p:spPr/>
+        <p:txBody>
+          <a:bodyPr/>
+          <a:lstStyle/>
+          <a:p>
+            <a:fld id="{1D3114E9-4222-4A72-8713-D3519DB6E1E0}" type="slidenum">
+              <a:rPr lang="en-US" smtClean="0">
+                <a:solidFill>
+                  <a:prstClr val="black">
+                    <a:tint val="75000"/>
+                  </a:prstClr>
+                </a:solidFill>
+              </a:rPr>
+              <a:pPr/>
+              <a:t>15</a:t>
+            </a:fld>
+            <a:endParaRPr lang="en-US">
+              <a:solidFill>
+                <a:prstClr val="black">
+                  <a:tint val="75000"/>
+                </a:prstClr>
+              </a:solidFill>
+            </a:endParaRPr>
+          </a:p>
+        </p:txBody>
+      </p:sp>
+      <p:sp>
+        <p:nvSpPr>
+          <p:cNvPr id="6" name="TextBox 5">
+            <a:extLst>
+              <a:ext uri="{FF2B5EF4-FFF2-40B4-BE49-F238E27FC236}">
+                <a16:creationId xmlns:a16="http://schemas.microsoft.com/office/drawing/2014/main" id="{3508F390-68A0-5390-5A51-42D33D3E7514}"/>
+              </a:ext>
+            </a:extLst>
+          </p:cNvPr>
+          <p:cNvSpPr txBox="1"/>
+          <p:nvPr/>
+        </p:nvSpPr>
+        <p:spPr>
+          <a:xfrm>
+            <a:off x="2286000" y="5069717"/>
+            <a:ext cx="4572000" cy="646331"/>
+          </a:xfrm>
+          <a:prstGeom prst="rect">
+            <a:avLst/>
+          </a:prstGeom>
+          <a:noFill/>
+          <a:ln w="12700">
+            <a:noFill/>
+          </a:ln>
+        </p:spPr>
+        <p:txBody>
+          <a:bodyPr wrap="square">
+            <a:spAutoFit/>
+          </a:bodyPr>
+          <a:lstStyle/>
+          <a:p>
+            <a:r>
+              <a:rPr lang="en-US" dirty="0"/>
+              <a:t>https://</a:t>
+            </a:r>
+            <a:r>
+              <a:rPr lang="en-US" dirty="0" err="1"/>
+              <a:t>www.youtube.com</a:t>
+            </a:r>
+            <a:r>
+              <a:rPr lang="en-US" dirty="0"/>
+              <a:t>/</a:t>
+            </a:r>
+            <a:r>
+              <a:rPr lang="en-US" dirty="0" err="1"/>
+              <a:t>watch?v</a:t>
+            </a:r>
+            <a:r>
+              <a:rPr lang="en-US" dirty="0"/>
+              <a:t>=Tkc_GOCjx7E</a:t>
+            </a:r>
+          </a:p>
+        </p:txBody>
+      </p:sp>
+      <p:pic>
+        <p:nvPicPr>
+          <p:cNvPr id="7" name="Picture 6">
+            <a:extLst>
+              <a:ext uri="{FF2B5EF4-FFF2-40B4-BE49-F238E27FC236}">
+                <a16:creationId xmlns:a16="http://schemas.microsoft.com/office/drawing/2014/main" id="{8562E978-FA3C-7A0B-E7E5-DB566A997CB9}"/>
+              </a:ext>
+            </a:extLst>
+          </p:cNvPr>
+          <p:cNvPicPr>
+            <a:picLocks noChangeAspect="1"/>
+          </p:cNvPicPr>
+          <p:nvPr/>
+        </p:nvPicPr>
+        <p:blipFill>
+          <a:blip r:embed="rId2"/>
+          <a:stretch>
+            <a:fillRect/>
+          </a:stretch>
+        </p:blipFill>
+        <p:spPr>
+          <a:xfrm>
+            <a:off x="685800" y="1417638"/>
+            <a:ext cx="7772400" cy="3646375"/>
+          </a:xfrm>
+          <a:prstGeom prst="rect">
+            <a:avLst/>
+          </a:prstGeom>
+        </p:spPr>
+      </p:pic>
+      <p:sp>
+        <p:nvSpPr>
+          <p:cNvPr id="8" name="TextBox 7">
+            <a:extLst>
+              <a:ext uri="{FF2B5EF4-FFF2-40B4-BE49-F238E27FC236}">
+                <a16:creationId xmlns:a16="http://schemas.microsoft.com/office/drawing/2014/main" id="{91045C6C-834A-9560-8189-FDBE6BF6FAE8}"/>
+              </a:ext>
+            </a:extLst>
+          </p:cNvPr>
+          <p:cNvSpPr txBox="1"/>
+          <p:nvPr/>
+        </p:nvSpPr>
+        <p:spPr>
+          <a:xfrm>
+            <a:off x="-62345" y="1652155"/>
+            <a:ext cx="0" cy="0"/>
+          </a:xfrm>
+          <a:prstGeom prst="rect">
+            <a:avLst/>
+          </a:prstGeom>
+          <a:noFill/>
+          <a:ln w="12700">
+            <a:noFill/>
+          </a:ln>
+        </p:spPr>
+        <p:txBody>
+          <a:bodyPr vert="horz" wrap="none" lIns="91440" tIns="45720" rIns="91440" bIns="45720" rtlCol="0">
+            <a:noAutofit/>
+          </a:bodyPr>
+          <a:lstStyle/>
+          <a:p>
+            <a:pPr marL="342900" indent="-342900" fontAlgn="auto">
+              <a:spcBef>
+                <a:spcPts val="0"/>
+              </a:spcBef>
+              <a:spcAft>
+                <a:spcPts val="600"/>
+              </a:spcAft>
+              <a:buClr>
+                <a:srgbClr val="0070C0"/>
+              </a:buClr>
+              <a:buSzPct val="100000"/>
+              <a:buFont typeface="Wingdings" pitchFamily="2" charset="2"/>
+              <a:buChar char="§"/>
+            </a:pPr>
+            <a:endParaRPr lang="en-US" sz="2800" dirty="0">
+              <a:solidFill>
+                <a:prstClr val="black"/>
+              </a:solidFill>
+              <a:latin typeface="Calibri"/>
+            </a:endParaRPr>
+          </a:p>
+        </p:txBody>
+      </p:sp>
+    </p:spTree>
+    <p:extLst>
+      <p:ext uri="{BB962C8B-B14F-4D97-AF65-F5344CB8AC3E}">
+        <p14:creationId xmlns:p14="http://schemas.microsoft.com/office/powerpoint/2010/main" val="1563135477"/>
+      </p:ext>
+    </p:extLst>
+  </p:cSld>
+  <p:clrMapOvr>
+    <a:masterClrMapping/>
+  </p:clrMapOvr>
+</p:sld>
+</file>
+
+<file path=ppt/slides/slide16.xml><?xml version="1.0" encoding="utf-8"?>
+<p:sld xmlns:a="http://schemas.openxmlformats.org/drawingml/2006/main" xmlns:r="http://schemas.openxmlformats.org/officeDocument/2006/relationships" xmlns:p="http://schemas.openxmlformats.org/presentationml/2006/main">
+  <p:cSld>
+    <p:spTree>
+      <p:nvGrpSpPr>
+        <p:cNvPr id="1" name=""/>
+        <p:cNvGrpSpPr/>
+        <p:nvPr/>
+      </p:nvGrpSpPr>
+      <p:grpSpPr>
+        <a:xfrm>
+          <a:off x="0" y="0"/>
+          <a:ext cx="0" cy="0"/>
+          <a:chOff x="0" y="0"/>
+          <a:chExt cx="0" cy="0"/>
+        </a:xfrm>
+      </p:grpSpPr>
+      <p:sp>
+        <p:nvSpPr>
           <p:cNvPr id="4" name="Title 1"/>
           <p:cNvSpPr txBox="1">
             <a:spLocks/>
@@ -10397,7 +10737,7 @@
                 </a:solidFill>
               </a:rPr>
               <a:pPr/>
-              <a:t>15</a:t>
+              <a:t>16</a:t>
             </a:fld>
             <a:endParaRPr lang="en-US">
               <a:solidFill>
@@ -10806,7 +11146,7 @@
 </p:sld>
 </file>
 
-<file path=ppt/slides/slide16.xml><?xml version="1.0" encoding="utf-8"?>
+<file path=ppt/slides/slide17.xml><?xml version="1.0" encoding="utf-8"?>
 <p:sld xmlns:a="http://schemas.openxmlformats.org/drawingml/2006/main" xmlns:r="http://schemas.openxmlformats.org/officeDocument/2006/relationships" xmlns:p="http://schemas.openxmlformats.org/presentationml/2006/main">
   <p:cSld>
     <p:spTree>
@@ -10911,7 +11251,7 @@
                 </a:solidFill>
               </a:rPr>
               <a:pPr/>
-              <a:t>16</a:t>
+              <a:t>17</a:t>
             </a:fld>
             <a:endParaRPr lang="en-US">
               <a:solidFill>
@@ -11330,7 +11670,7 @@
 </p:sld>
 </file>
 
-<file path=ppt/slides/slide17.xml><?xml version="1.0" encoding="utf-8"?>
+<file path=ppt/slides/slide18.xml><?xml version="1.0" encoding="utf-8"?>
 <p:sld xmlns:a="http://schemas.openxmlformats.org/drawingml/2006/main" xmlns:r="http://schemas.openxmlformats.org/officeDocument/2006/relationships" xmlns:p="http://schemas.openxmlformats.org/presentationml/2006/main">
   <p:cSld>
     <p:spTree>
@@ -11435,7 +11775,7 @@
                 </a:solidFill>
               </a:rPr>
               <a:pPr/>
-              <a:t>17</a:t>
+              <a:t>18</a:t>
             </a:fld>
             <a:endParaRPr lang="en-US">
               <a:solidFill>
@@ -11983,7 +12323,7 @@
           <p:nvPr/>
         </p:nvPicPr>
         <p:blipFill rotWithShape="1">
-          <a:blip r:embed="rId2">
+          <a:blip r:embed="rId3">
             <a:extLst>
               <a:ext uri="{28A0092B-C50C-407E-A947-70E740481C1C}">
                 <a14:useLocalDpi xmlns:a14="http://schemas.microsoft.com/office/drawing/2010/main" val="0"/>
@@ -12026,7 +12366,7 @@
 </p:sld>
 </file>
 
-<file path=ppt/slides/slide18.xml><?xml version="1.0" encoding="utf-8"?>
+<file path=ppt/slides/slide19.xml><?xml version="1.0" encoding="utf-8"?>
 <p:sld xmlns:a="http://schemas.openxmlformats.org/drawingml/2006/main" xmlns:r="http://schemas.openxmlformats.org/officeDocument/2006/relationships" xmlns:p="http://schemas.openxmlformats.org/presentationml/2006/main">
   <p:cSld>
     <p:spTree>
@@ -12131,7 +12471,7 @@
                 </a:solidFill>
               </a:rPr>
               <a:pPr/>
-              <a:t>18</a:t>
+              <a:t>19</a:t>
             </a:fld>
             <a:endParaRPr lang="en-US">
               <a:solidFill>
@@ -12405,7 +12745,7 @@
 </p:sld>
 </file>
 
-<file path=ppt/slides/slide19.xml><?xml version="1.0" encoding="utf-8"?>
+<file path=ppt/slides/slide2.xml><?xml version="1.0" encoding="utf-8"?>
 <p:sld xmlns:a="http://schemas.openxmlformats.org/drawingml/2006/main" xmlns:r="http://schemas.openxmlformats.org/officeDocument/2006/relationships" xmlns:p="http://schemas.openxmlformats.org/presentationml/2006/main">
   <p:cSld>
     <p:spTree>
@@ -12475,8 +12815,341 @@
                 </a:solidFill>
                 <a:latin typeface="Garamond" panose="02020404030301010803" pitchFamily="18" charset="0"/>
               </a:rPr>
-              <a:t>Selecting confocal light</a:t>
-            </a:r>
+              <a:t>Recap from last time</a:t>
+            </a:r>
+          </a:p>
+        </p:txBody>
+      </p:sp>
+      <p:sp>
+        <p:nvSpPr>
+          <p:cNvPr id="6" name="TextBox 5">
+            <a:extLst>
+              <a:ext uri="{FF2B5EF4-FFF2-40B4-BE49-F238E27FC236}">
+                <a16:creationId xmlns:a16="http://schemas.microsoft.com/office/drawing/2014/main" id="{F9681B62-3C5E-4842-BFE1-906D35D7BCAA}"/>
+              </a:ext>
+            </a:extLst>
+          </p:cNvPr>
+          <p:cNvSpPr txBox="1"/>
+          <p:nvPr/>
+        </p:nvSpPr>
+        <p:spPr>
+          <a:xfrm>
+            <a:off x="248452" y="1282145"/>
+            <a:ext cx="8628419" cy="5195224"/>
+          </a:xfrm>
+          <a:prstGeom prst="rect">
+            <a:avLst/>
+          </a:prstGeom>
+          <a:noFill/>
+          <a:ln w="12700">
+            <a:noFill/>
+          </a:ln>
+        </p:spPr>
+        <p:txBody>
+          <a:bodyPr vert="horz" wrap="square" lIns="91440" tIns="45720" rIns="91440" bIns="45720" rtlCol="0">
+            <a:noAutofit/>
+          </a:bodyPr>
+          <a:lstStyle/>
+          <a:p>
+            <a:pPr marL="342900" indent="-342900" fontAlgn="auto">
+              <a:spcBef>
+                <a:spcPts val="0"/>
+              </a:spcBef>
+              <a:spcAft>
+                <a:spcPts val="0"/>
+              </a:spcAft>
+              <a:buClr>
+                <a:schemeClr val="bg1">
+                  <a:lumMod val="50000"/>
+                </a:schemeClr>
+              </a:buClr>
+              <a:buSzPct val="100000"/>
+              <a:buFont typeface="Arial" panose="020B0604020202020204" pitchFamily="34" charset="0"/>
+              <a:buChar char="•"/>
+            </a:pPr>
+            <a:r>
+              <a:rPr lang="en-US" sz="2800" dirty="0">
+                <a:latin typeface="Helvetica Neue" panose="02000503000000020004" pitchFamily="2" charset="0"/>
+                <a:ea typeface="Helvetica Neue" panose="02000503000000020004" pitchFamily="2" charset="0"/>
+                <a:cs typeface="Helvetica Neue" panose="02000503000000020004" pitchFamily="2" charset="0"/>
+              </a:rPr>
+              <a:t>Commonly used sensors are </a:t>
+            </a:r>
+            <a:r>
+              <a:rPr lang="en-US" sz="2800" b="1" i="1" dirty="0">
+                <a:latin typeface="Helvetica Neue" panose="02000503000000020004" pitchFamily="2" charset="0"/>
+                <a:ea typeface="Helvetica Neue" panose="02000503000000020004" pitchFamily="2" charset="0"/>
+                <a:cs typeface="Helvetica Neue" panose="02000503000000020004" pitchFamily="2" charset="0"/>
+              </a:rPr>
+              <a:t>(EM)CCD </a:t>
+            </a:r>
+            <a:r>
+              <a:rPr lang="en-US" sz="2800" dirty="0">
+                <a:latin typeface="Helvetica Neue" panose="02000503000000020004" pitchFamily="2" charset="0"/>
+                <a:ea typeface="Helvetica Neue" panose="02000503000000020004" pitchFamily="2" charset="0"/>
+                <a:cs typeface="Helvetica Neue" panose="02000503000000020004" pitchFamily="2" charset="0"/>
+              </a:rPr>
+              <a:t>and</a:t>
+            </a:r>
+            <a:r>
+              <a:rPr lang="en-US" sz="2800" i="1" dirty="0">
+                <a:latin typeface="Helvetica Neue" panose="02000503000000020004" pitchFamily="2" charset="0"/>
+                <a:ea typeface="Helvetica Neue" panose="02000503000000020004" pitchFamily="2" charset="0"/>
+                <a:cs typeface="Helvetica Neue" panose="02000503000000020004" pitchFamily="2" charset="0"/>
+              </a:rPr>
+              <a:t> </a:t>
+            </a:r>
+            <a:r>
+              <a:rPr lang="en-US" sz="2800" b="1" i="1" dirty="0" err="1">
+                <a:latin typeface="Helvetica Neue" panose="02000503000000020004" pitchFamily="2" charset="0"/>
+                <a:ea typeface="Helvetica Neue" panose="02000503000000020004" pitchFamily="2" charset="0"/>
+                <a:cs typeface="Helvetica Neue" panose="02000503000000020004" pitchFamily="2" charset="0"/>
+              </a:rPr>
+              <a:t>sCMOS</a:t>
+            </a:r>
+            <a:r>
+              <a:rPr lang="en-US" sz="2800" b="1" i="1" dirty="0">
+                <a:latin typeface="Helvetica Neue" panose="02000503000000020004" pitchFamily="2" charset="0"/>
+                <a:ea typeface="Helvetica Neue" panose="02000503000000020004" pitchFamily="2" charset="0"/>
+                <a:cs typeface="Helvetica Neue" panose="02000503000000020004" pitchFamily="2" charset="0"/>
+              </a:rPr>
+              <a:t> </a:t>
+            </a:r>
+            <a:r>
+              <a:rPr lang="en-US" sz="2800" dirty="0">
+                <a:latin typeface="Helvetica Neue" panose="02000503000000020004" pitchFamily="2" charset="0"/>
+                <a:ea typeface="Helvetica Neue" panose="02000503000000020004" pitchFamily="2" charset="0"/>
+                <a:cs typeface="Helvetica Neue" panose="02000503000000020004" pitchFamily="2" charset="0"/>
+              </a:rPr>
+              <a:t>cameras and </a:t>
+            </a:r>
+            <a:r>
+              <a:rPr lang="en-US" sz="2800" b="1" i="1" dirty="0" err="1">
+                <a:latin typeface="Helvetica Neue" panose="02000503000000020004" pitchFamily="2" charset="0"/>
+                <a:ea typeface="Helvetica Neue" panose="02000503000000020004" pitchFamily="2" charset="0"/>
+                <a:cs typeface="Helvetica Neue" panose="02000503000000020004" pitchFamily="2" charset="0"/>
+              </a:rPr>
+              <a:t>Photomultipler</a:t>
+            </a:r>
+            <a:r>
+              <a:rPr lang="en-US" sz="2800" b="1" i="1" dirty="0">
+                <a:latin typeface="Helvetica Neue" panose="02000503000000020004" pitchFamily="2" charset="0"/>
+                <a:ea typeface="Helvetica Neue" panose="02000503000000020004" pitchFamily="2" charset="0"/>
+                <a:cs typeface="Helvetica Neue" panose="02000503000000020004" pitchFamily="2" charset="0"/>
+              </a:rPr>
+              <a:t> tubes (PMTs)</a:t>
+            </a:r>
+            <a:endParaRPr lang="en-US" sz="2800" b="1" dirty="0">
+              <a:latin typeface="Helvetica Neue" panose="02000503000000020004" pitchFamily="2" charset="0"/>
+              <a:ea typeface="Helvetica Neue" panose="02000503000000020004" pitchFamily="2" charset="0"/>
+              <a:cs typeface="Helvetica Neue" panose="02000503000000020004" pitchFamily="2" charset="0"/>
+            </a:endParaRPr>
+          </a:p>
+          <a:p>
+            <a:pPr fontAlgn="auto">
+              <a:spcBef>
+                <a:spcPts val="0"/>
+              </a:spcBef>
+              <a:spcAft>
+                <a:spcPts val="0"/>
+              </a:spcAft>
+              <a:buClr>
+                <a:schemeClr val="bg1">
+                  <a:lumMod val="50000"/>
+                </a:schemeClr>
+              </a:buClr>
+              <a:buSzPct val="100000"/>
+            </a:pPr>
+            <a:r>
+              <a:rPr lang="en-US" sz="2800" dirty="0">
+                <a:latin typeface="Helvetica Neue" panose="02000503000000020004" pitchFamily="2" charset="0"/>
+                <a:ea typeface="Helvetica Neue" panose="02000503000000020004" pitchFamily="2" charset="0"/>
+                <a:cs typeface="Helvetica Neue" panose="02000503000000020004" pitchFamily="2" charset="0"/>
+              </a:rPr>
+              <a:t>  </a:t>
+            </a:r>
+          </a:p>
+          <a:p>
+            <a:pPr marL="342900" indent="-342900" fontAlgn="auto">
+              <a:spcBef>
+                <a:spcPts val="0"/>
+              </a:spcBef>
+              <a:spcAft>
+                <a:spcPts val="0"/>
+              </a:spcAft>
+              <a:buClr>
+                <a:schemeClr val="bg1">
+                  <a:lumMod val="50000"/>
+                </a:schemeClr>
+              </a:buClr>
+              <a:buSzPct val="100000"/>
+              <a:buFont typeface="Arial" panose="020B0604020202020204" pitchFamily="34" charset="0"/>
+              <a:buChar char="•"/>
+            </a:pPr>
+            <a:r>
+              <a:rPr lang="en-US" sz="2800" dirty="0">
+                <a:latin typeface="Helvetica Neue" panose="02000503000000020004" pitchFamily="2" charset="0"/>
+                <a:ea typeface="Helvetica Neue" panose="02000503000000020004" pitchFamily="2" charset="0"/>
+                <a:cs typeface="Helvetica Neue" panose="02000503000000020004" pitchFamily="2" charset="0"/>
+              </a:rPr>
+              <a:t>Optical sensors use the photoelectric effect to convert incident photons into electrons</a:t>
+            </a:r>
+          </a:p>
+          <a:p>
+            <a:pPr fontAlgn="auto">
+              <a:spcBef>
+                <a:spcPts val="0"/>
+              </a:spcBef>
+              <a:spcAft>
+                <a:spcPts val="0"/>
+              </a:spcAft>
+              <a:buClr>
+                <a:schemeClr val="bg1">
+                  <a:lumMod val="50000"/>
+                </a:schemeClr>
+              </a:buClr>
+              <a:buSzPct val="100000"/>
+            </a:pPr>
+            <a:r>
+              <a:rPr lang="en-US" sz="2800" dirty="0">
+                <a:latin typeface="Helvetica Neue" panose="02000503000000020004" pitchFamily="2" charset="0"/>
+                <a:ea typeface="Helvetica Neue" panose="02000503000000020004" pitchFamily="2" charset="0"/>
+                <a:cs typeface="Helvetica Neue" panose="02000503000000020004" pitchFamily="2" charset="0"/>
+              </a:rPr>
+              <a:t> </a:t>
+            </a:r>
+          </a:p>
+          <a:p>
+            <a:pPr marL="342900" indent="-342900" fontAlgn="auto">
+              <a:spcBef>
+                <a:spcPts val="0"/>
+              </a:spcBef>
+              <a:spcAft>
+                <a:spcPts val="0"/>
+              </a:spcAft>
+              <a:buClr>
+                <a:schemeClr val="bg1">
+                  <a:lumMod val="50000"/>
+                </a:schemeClr>
+              </a:buClr>
+              <a:buSzPct val="100000"/>
+              <a:buFont typeface="Arial" panose="020B0604020202020204" pitchFamily="34" charset="0"/>
+              <a:buChar char="•"/>
+            </a:pPr>
+            <a:r>
+              <a:rPr lang="en-US" sz="2800" dirty="0">
+                <a:latin typeface="Helvetica Neue" panose="02000503000000020004" pitchFamily="2" charset="0"/>
+                <a:ea typeface="Helvetica Neue" panose="02000503000000020004" pitchFamily="2" charset="0"/>
+                <a:cs typeface="Helvetica Neue" panose="02000503000000020004" pitchFamily="2" charset="0"/>
+              </a:rPr>
+              <a:t>Conversion of photoelectrons to digital information occurs via an </a:t>
+            </a:r>
+            <a:r>
+              <a:rPr lang="en-US" sz="2800" b="1" i="1" dirty="0">
+                <a:latin typeface="Helvetica Neue" panose="02000503000000020004" pitchFamily="2" charset="0"/>
+                <a:ea typeface="Helvetica Neue" panose="02000503000000020004" pitchFamily="2" charset="0"/>
+                <a:cs typeface="Helvetica Neue" panose="02000503000000020004" pitchFamily="2" charset="0"/>
+              </a:rPr>
+              <a:t>analog-digital converter (ADC)</a:t>
+            </a:r>
+            <a:endParaRPr lang="en-US" sz="2800" dirty="0">
+              <a:latin typeface="Helvetica Neue" panose="02000503000000020004" pitchFamily="2" charset="0"/>
+              <a:ea typeface="Helvetica Neue" panose="02000503000000020004" pitchFamily="2" charset="0"/>
+              <a:cs typeface="Helvetica Neue" panose="02000503000000020004" pitchFamily="2" charset="0"/>
+            </a:endParaRPr>
+          </a:p>
+          <a:p>
+            <a:pPr fontAlgn="auto">
+              <a:spcBef>
+                <a:spcPts val="0"/>
+              </a:spcBef>
+              <a:spcAft>
+                <a:spcPts val="0"/>
+              </a:spcAft>
+              <a:buClr>
+                <a:schemeClr val="bg1">
+                  <a:lumMod val="50000"/>
+                </a:schemeClr>
+              </a:buClr>
+              <a:buSzPct val="100000"/>
+            </a:pPr>
+            <a:endParaRPr lang="en-US" sz="2800" dirty="0">
+              <a:latin typeface="Helvetica Neue" panose="02000503000000020004" pitchFamily="2" charset="0"/>
+              <a:ea typeface="Helvetica Neue" panose="02000503000000020004" pitchFamily="2" charset="0"/>
+              <a:cs typeface="Helvetica Neue" panose="02000503000000020004" pitchFamily="2" charset="0"/>
+            </a:endParaRPr>
+          </a:p>
+          <a:p>
+            <a:pPr marL="342900" indent="-342900" fontAlgn="auto">
+              <a:spcBef>
+                <a:spcPts val="0"/>
+              </a:spcBef>
+              <a:spcAft>
+                <a:spcPts val="0"/>
+              </a:spcAft>
+              <a:buClr>
+                <a:schemeClr val="bg1">
+                  <a:lumMod val="50000"/>
+                </a:schemeClr>
+              </a:buClr>
+              <a:buSzPct val="100000"/>
+              <a:buFont typeface="Arial" panose="020B0604020202020204" pitchFamily="34" charset="0"/>
+              <a:buChar char="•"/>
+            </a:pPr>
+            <a:r>
+              <a:rPr lang="en-US" sz="2800" dirty="0">
+                <a:latin typeface="Helvetica Neue" panose="02000503000000020004" pitchFamily="2" charset="0"/>
+                <a:ea typeface="Helvetica Neue" panose="02000503000000020004" pitchFamily="2" charset="0"/>
+                <a:cs typeface="Helvetica Neue" panose="02000503000000020004" pitchFamily="2" charset="0"/>
+              </a:rPr>
+              <a:t>Tradeoffs center around dynamic range and sensitivity</a:t>
+            </a:r>
+          </a:p>
+          <a:p>
+            <a:pPr marL="342900" indent="-342900" fontAlgn="auto">
+              <a:spcBef>
+                <a:spcPts val="0"/>
+              </a:spcBef>
+              <a:spcAft>
+                <a:spcPts val="0"/>
+              </a:spcAft>
+              <a:buClr>
+                <a:schemeClr val="bg1">
+                  <a:lumMod val="50000"/>
+                </a:schemeClr>
+              </a:buClr>
+              <a:buSzPct val="100000"/>
+              <a:buFont typeface="Arial" panose="020B0604020202020204" pitchFamily="34" charset="0"/>
+              <a:buChar char="•"/>
+            </a:pPr>
+            <a:endParaRPr lang="en-US" sz="2800" dirty="0">
+              <a:latin typeface="Helvetica Neue" panose="02000503000000020004" pitchFamily="2" charset="0"/>
+              <a:ea typeface="Helvetica Neue" panose="02000503000000020004" pitchFamily="2" charset="0"/>
+              <a:cs typeface="Helvetica Neue" panose="02000503000000020004" pitchFamily="2" charset="0"/>
+            </a:endParaRPr>
+          </a:p>
+          <a:p>
+            <a:pPr marL="342900" indent="-342900" fontAlgn="auto">
+              <a:spcBef>
+                <a:spcPts val="0"/>
+              </a:spcBef>
+              <a:spcAft>
+                <a:spcPts val="0"/>
+              </a:spcAft>
+              <a:buClr>
+                <a:schemeClr val="bg1">
+                  <a:lumMod val="50000"/>
+                </a:schemeClr>
+              </a:buClr>
+              <a:buSzPct val="100000"/>
+              <a:buFont typeface="Arial" panose="020B0604020202020204" pitchFamily="34" charset="0"/>
+              <a:buChar char="•"/>
+            </a:pPr>
+            <a:endParaRPr lang="en-US" sz="2800" dirty="0">
+              <a:latin typeface="Helvetica Neue" panose="02000503000000020004" pitchFamily="2" charset="0"/>
+              <a:ea typeface="Helvetica Neue" panose="02000503000000020004" pitchFamily="2" charset="0"/>
+              <a:cs typeface="Helvetica Neue" panose="02000503000000020004" pitchFamily="2" charset="0"/>
+            </a:endParaRPr>
           </a:p>
         </p:txBody>
       </p:sp>
@@ -12510,7 +13183,137 @@
                 </a:solidFill>
               </a:rPr>
               <a:pPr/>
-              <a:t>19</a:t>
+              <a:t>2</a:t>
+            </a:fld>
+            <a:endParaRPr lang="en-US" dirty="0">
+              <a:solidFill>
+                <a:prstClr val="black">
+                  <a:tint val="75000"/>
+                </a:prstClr>
+              </a:solidFill>
+            </a:endParaRPr>
+          </a:p>
+        </p:txBody>
+      </p:sp>
+    </p:spTree>
+    <p:extLst>
+      <p:ext uri="{BB962C8B-B14F-4D97-AF65-F5344CB8AC3E}">
+        <p14:creationId xmlns:p14="http://schemas.microsoft.com/office/powerpoint/2010/main" val="926296186"/>
+      </p:ext>
+    </p:extLst>
+  </p:cSld>
+  <p:clrMapOvr>
+    <a:masterClrMapping/>
+  </p:clrMapOvr>
+</p:sld>
+</file>
+
+<file path=ppt/slides/slide20.xml><?xml version="1.0" encoding="utf-8"?>
+<p:sld xmlns:a="http://schemas.openxmlformats.org/drawingml/2006/main" xmlns:r="http://schemas.openxmlformats.org/officeDocument/2006/relationships" xmlns:p="http://schemas.openxmlformats.org/presentationml/2006/main">
+  <p:cSld>
+    <p:spTree>
+      <p:nvGrpSpPr>
+        <p:cNvPr id="1" name=""/>
+        <p:cNvGrpSpPr/>
+        <p:nvPr/>
+      </p:nvGrpSpPr>
+      <p:grpSpPr>
+        <a:xfrm>
+          <a:off x="0" y="0"/>
+          <a:ext cx="0" cy="0"/>
+          <a:chOff x="0" y="0"/>
+          <a:chExt cx="0" cy="0"/>
+        </a:xfrm>
+      </p:grpSpPr>
+      <p:sp>
+        <p:nvSpPr>
+          <p:cNvPr id="4" name="Title 1"/>
+          <p:cNvSpPr txBox="1">
+            <a:spLocks/>
+          </p:cNvSpPr>
+          <p:nvPr/>
+        </p:nvSpPr>
+        <p:spPr>
+          <a:xfrm>
+            <a:off x="0" y="41589"/>
+            <a:ext cx="9144000" cy="1139825"/>
+          </a:xfrm>
+          <a:prstGeom prst="rect">
+            <a:avLst/>
+          </a:prstGeom>
+        </p:spPr>
+        <p:txBody>
+          <a:bodyPr vert="horz" lIns="91440" tIns="45720" rIns="91440" bIns="45720" rtlCol="0" anchor="ctr">
+            <a:normAutofit/>
+          </a:bodyPr>
+          <a:lstStyle>
+            <a:lvl1pPr algn="ctr" defTabSz="914400" rtl="0" eaLnBrk="1" latinLnBrk="0" hangingPunct="1">
+              <a:spcBef>
+                <a:spcPct val="0"/>
+              </a:spcBef>
+              <a:buNone/>
+              <a:defRPr sz="4400" kern="1200">
+                <a:solidFill>
+                  <a:schemeClr val="tx1"/>
+                </a:solidFill>
+                <a:latin typeface="+mj-lt"/>
+                <a:ea typeface="+mj-ea"/>
+                <a:cs typeface="+mj-cs"/>
+              </a:defRPr>
+            </a:lvl1pPr>
+          </a:lstStyle>
+          <a:p>
+            <a:pPr fontAlgn="auto">
+              <a:spcAft>
+                <a:spcPts val="0"/>
+              </a:spcAft>
+            </a:pPr>
+            <a:r>
+              <a:rPr lang="en-US" b="1" dirty="0">
+                <a:solidFill>
+                  <a:schemeClr val="tx1">
+                    <a:lumMod val="65000"/>
+                    <a:lumOff val="35000"/>
+                  </a:schemeClr>
+                </a:solidFill>
+                <a:latin typeface="Garamond" panose="02020404030301010803" pitchFamily="18" charset="0"/>
+              </a:rPr>
+              <a:t>Selecting confocal light</a:t>
+            </a:r>
+          </a:p>
+        </p:txBody>
+      </p:sp>
+      <p:sp>
+        <p:nvSpPr>
+          <p:cNvPr id="2" name="Slide Number Placeholder 1">
+            <a:extLst>
+              <a:ext uri="{FF2B5EF4-FFF2-40B4-BE49-F238E27FC236}">
+                <a16:creationId xmlns:a16="http://schemas.microsoft.com/office/drawing/2014/main" id="{A67DA90B-656D-8349-8950-078AABAE1757}"/>
+              </a:ext>
+            </a:extLst>
+          </p:cNvPr>
+          <p:cNvSpPr>
+            <a:spLocks noGrp="1"/>
+          </p:cNvSpPr>
+          <p:nvPr>
+            <p:ph type="sldNum" sz="quarter" idx="12"/>
+          </p:nvPr>
+        </p:nvSpPr>
+        <p:spPr/>
+        <p:txBody>
+          <a:bodyPr/>
+          <a:lstStyle/>
+          <a:p>
+            <a:fld id="{1D3114E9-4222-4A72-8713-D3519DB6E1E0}" type="slidenum">
+              <a:rPr lang="en-US" smtClean="0">
+                <a:solidFill>
+                  <a:prstClr val="black">
+                    <a:tint val="75000"/>
+                  </a:prstClr>
+                </a:solidFill>
+              </a:rPr>
+              <a:pPr/>
+              <a:t>20</a:t>
             </a:fld>
             <a:endParaRPr lang="en-US">
               <a:solidFill>
@@ -12688,7 +13491,7 @@
 </p:sld>
 </file>
 
-<file path=ppt/slides/slide2.xml><?xml version="1.0" encoding="utf-8"?>
+<file path=ppt/slides/slide21.xml><?xml version="1.0" encoding="utf-8"?>
 <p:sld xmlns:a="http://schemas.openxmlformats.org/drawingml/2006/main" xmlns:r="http://schemas.openxmlformats.org/officeDocument/2006/relationships" xmlns:p="http://schemas.openxmlformats.org/presentationml/2006/main">
   <p:cSld>
     <p:spTree>
@@ -12758,341 +13561,8 @@
                 </a:solidFill>
                 <a:latin typeface="Garamond" panose="02020404030301010803" pitchFamily="18" charset="0"/>
               </a:rPr>
-              <a:t>Recap from last time</a:t>
-            </a:r>
-          </a:p>
-        </p:txBody>
-      </p:sp>
-      <p:sp>
-        <p:nvSpPr>
-          <p:cNvPr id="6" name="TextBox 5">
-            <a:extLst>
-              <a:ext uri="{FF2B5EF4-FFF2-40B4-BE49-F238E27FC236}">
-                <a16:creationId xmlns:a16="http://schemas.microsoft.com/office/drawing/2014/main" id="{F9681B62-3C5E-4842-BFE1-906D35D7BCAA}"/>
-              </a:ext>
-            </a:extLst>
-          </p:cNvPr>
-          <p:cNvSpPr txBox="1"/>
-          <p:nvPr/>
-        </p:nvSpPr>
-        <p:spPr>
-          <a:xfrm>
-            <a:off x="248452" y="1282145"/>
-            <a:ext cx="8628419" cy="5195224"/>
-          </a:xfrm>
-          <a:prstGeom prst="rect">
-            <a:avLst/>
-          </a:prstGeom>
-          <a:noFill/>
-          <a:ln w="12700">
-            <a:noFill/>
-          </a:ln>
-        </p:spPr>
-        <p:txBody>
-          <a:bodyPr vert="horz" wrap="square" lIns="91440" tIns="45720" rIns="91440" bIns="45720" rtlCol="0">
-            <a:noAutofit/>
-          </a:bodyPr>
-          <a:lstStyle/>
-          <a:p>
-            <a:pPr marL="342900" indent="-342900" fontAlgn="auto">
-              <a:spcBef>
-                <a:spcPts val="0"/>
-              </a:spcBef>
-              <a:spcAft>
-                <a:spcPts val="0"/>
-              </a:spcAft>
-              <a:buClr>
-                <a:schemeClr val="bg1">
-                  <a:lumMod val="50000"/>
-                </a:schemeClr>
-              </a:buClr>
-              <a:buSzPct val="100000"/>
-              <a:buFont typeface="Arial" panose="020B0604020202020204" pitchFamily="34" charset="0"/>
-              <a:buChar char="•"/>
-            </a:pPr>
-            <a:r>
-              <a:rPr lang="en-US" sz="2800" dirty="0">
-                <a:latin typeface="Helvetica Neue" panose="02000503000000020004" pitchFamily="2" charset="0"/>
-                <a:ea typeface="Helvetica Neue" panose="02000503000000020004" pitchFamily="2" charset="0"/>
-                <a:cs typeface="Helvetica Neue" panose="02000503000000020004" pitchFamily="2" charset="0"/>
-              </a:rPr>
-              <a:t>Commonly used sensors are </a:t>
-            </a:r>
-            <a:r>
-              <a:rPr lang="en-US" sz="2800" b="1" i="1" dirty="0">
-                <a:latin typeface="Helvetica Neue" panose="02000503000000020004" pitchFamily="2" charset="0"/>
-                <a:ea typeface="Helvetica Neue" panose="02000503000000020004" pitchFamily="2" charset="0"/>
-                <a:cs typeface="Helvetica Neue" panose="02000503000000020004" pitchFamily="2" charset="0"/>
-              </a:rPr>
-              <a:t>(EM)CCD </a:t>
-            </a:r>
-            <a:r>
-              <a:rPr lang="en-US" sz="2800" dirty="0">
-                <a:latin typeface="Helvetica Neue" panose="02000503000000020004" pitchFamily="2" charset="0"/>
-                <a:ea typeface="Helvetica Neue" panose="02000503000000020004" pitchFamily="2" charset="0"/>
-                <a:cs typeface="Helvetica Neue" panose="02000503000000020004" pitchFamily="2" charset="0"/>
-              </a:rPr>
-              <a:t>and</a:t>
-            </a:r>
-            <a:r>
-              <a:rPr lang="en-US" sz="2800" i="1" dirty="0">
-                <a:latin typeface="Helvetica Neue" panose="02000503000000020004" pitchFamily="2" charset="0"/>
-                <a:ea typeface="Helvetica Neue" panose="02000503000000020004" pitchFamily="2" charset="0"/>
-                <a:cs typeface="Helvetica Neue" panose="02000503000000020004" pitchFamily="2" charset="0"/>
-              </a:rPr>
-              <a:t> </a:t>
-            </a:r>
-            <a:r>
-              <a:rPr lang="en-US" sz="2800" b="1" i="1" dirty="0" err="1">
-                <a:latin typeface="Helvetica Neue" panose="02000503000000020004" pitchFamily="2" charset="0"/>
-                <a:ea typeface="Helvetica Neue" panose="02000503000000020004" pitchFamily="2" charset="0"/>
-                <a:cs typeface="Helvetica Neue" panose="02000503000000020004" pitchFamily="2" charset="0"/>
-              </a:rPr>
-              <a:t>sCMOS</a:t>
-            </a:r>
-            <a:r>
-              <a:rPr lang="en-US" sz="2800" b="1" i="1" dirty="0">
-                <a:latin typeface="Helvetica Neue" panose="02000503000000020004" pitchFamily="2" charset="0"/>
-                <a:ea typeface="Helvetica Neue" panose="02000503000000020004" pitchFamily="2" charset="0"/>
-                <a:cs typeface="Helvetica Neue" panose="02000503000000020004" pitchFamily="2" charset="0"/>
-              </a:rPr>
-              <a:t> </a:t>
-            </a:r>
-            <a:r>
-              <a:rPr lang="en-US" sz="2800" dirty="0">
-                <a:latin typeface="Helvetica Neue" panose="02000503000000020004" pitchFamily="2" charset="0"/>
-                <a:ea typeface="Helvetica Neue" panose="02000503000000020004" pitchFamily="2" charset="0"/>
-                <a:cs typeface="Helvetica Neue" panose="02000503000000020004" pitchFamily="2" charset="0"/>
-              </a:rPr>
-              <a:t>cameras and </a:t>
-            </a:r>
-            <a:r>
-              <a:rPr lang="en-US" sz="2800" b="1" i="1" dirty="0" err="1">
-                <a:latin typeface="Helvetica Neue" panose="02000503000000020004" pitchFamily="2" charset="0"/>
-                <a:ea typeface="Helvetica Neue" panose="02000503000000020004" pitchFamily="2" charset="0"/>
-                <a:cs typeface="Helvetica Neue" panose="02000503000000020004" pitchFamily="2" charset="0"/>
-              </a:rPr>
-              <a:t>Photomultipler</a:t>
-            </a:r>
-            <a:r>
-              <a:rPr lang="en-US" sz="2800" b="1" i="1" dirty="0">
-                <a:latin typeface="Helvetica Neue" panose="02000503000000020004" pitchFamily="2" charset="0"/>
-                <a:ea typeface="Helvetica Neue" panose="02000503000000020004" pitchFamily="2" charset="0"/>
-                <a:cs typeface="Helvetica Neue" panose="02000503000000020004" pitchFamily="2" charset="0"/>
-              </a:rPr>
-              <a:t> tubes (PMTs)</a:t>
-            </a:r>
-            <a:endParaRPr lang="en-US" sz="2800" b="1" dirty="0">
-              <a:latin typeface="Helvetica Neue" panose="02000503000000020004" pitchFamily="2" charset="0"/>
-              <a:ea typeface="Helvetica Neue" panose="02000503000000020004" pitchFamily="2" charset="0"/>
-              <a:cs typeface="Helvetica Neue" panose="02000503000000020004" pitchFamily="2" charset="0"/>
-            </a:endParaRPr>
-          </a:p>
-          <a:p>
-            <a:pPr fontAlgn="auto">
-              <a:spcBef>
-                <a:spcPts val="0"/>
-              </a:spcBef>
-              <a:spcAft>
-                <a:spcPts val="0"/>
-              </a:spcAft>
-              <a:buClr>
-                <a:schemeClr val="bg1">
-                  <a:lumMod val="50000"/>
-                </a:schemeClr>
-              </a:buClr>
-              <a:buSzPct val="100000"/>
-            </a:pPr>
-            <a:r>
-              <a:rPr lang="en-US" sz="2800" dirty="0">
-                <a:latin typeface="Helvetica Neue" panose="02000503000000020004" pitchFamily="2" charset="0"/>
-                <a:ea typeface="Helvetica Neue" panose="02000503000000020004" pitchFamily="2" charset="0"/>
-                <a:cs typeface="Helvetica Neue" panose="02000503000000020004" pitchFamily="2" charset="0"/>
-              </a:rPr>
-              <a:t>  </a:t>
-            </a:r>
-          </a:p>
-          <a:p>
-            <a:pPr marL="342900" indent="-342900" fontAlgn="auto">
-              <a:spcBef>
-                <a:spcPts val="0"/>
-              </a:spcBef>
-              <a:spcAft>
-                <a:spcPts val="0"/>
-              </a:spcAft>
-              <a:buClr>
-                <a:schemeClr val="bg1">
-                  <a:lumMod val="50000"/>
-                </a:schemeClr>
-              </a:buClr>
-              <a:buSzPct val="100000"/>
-              <a:buFont typeface="Arial" panose="020B0604020202020204" pitchFamily="34" charset="0"/>
-              <a:buChar char="•"/>
-            </a:pPr>
-            <a:r>
-              <a:rPr lang="en-US" sz="2800" dirty="0">
-                <a:latin typeface="Helvetica Neue" panose="02000503000000020004" pitchFamily="2" charset="0"/>
-                <a:ea typeface="Helvetica Neue" panose="02000503000000020004" pitchFamily="2" charset="0"/>
-                <a:cs typeface="Helvetica Neue" panose="02000503000000020004" pitchFamily="2" charset="0"/>
-              </a:rPr>
-              <a:t>Optical sensors use the photoelectric effect to convert incident photons into electrons</a:t>
-            </a:r>
-          </a:p>
-          <a:p>
-            <a:pPr fontAlgn="auto">
-              <a:spcBef>
-                <a:spcPts val="0"/>
-              </a:spcBef>
-              <a:spcAft>
-                <a:spcPts val="0"/>
-              </a:spcAft>
-              <a:buClr>
-                <a:schemeClr val="bg1">
-                  <a:lumMod val="50000"/>
-                </a:schemeClr>
-              </a:buClr>
-              <a:buSzPct val="100000"/>
-            </a:pPr>
-            <a:r>
-              <a:rPr lang="en-US" sz="2800" dirty="0">
-                <a:latin typeface="Helvetica Neue" panose="02000503000000020004" pitchFamily="2" charset="0"/>
-                <a:ea typeface="Helvetica Neue" panose="02000503000000020004" pitchFamily="2" charset="0"/>
-                <a:cs typeface="Helvetica Neue" panose="02000503000000020004" pitchFamily="2" charset="0"/>
-              </a:rPr>
-              <a:t> </a:t>
-            </a:r>
-          </a:p>
-          <a:p>
-            <a:pPr marL="342900" indent="-342900" fontAlgn="auto">
-              <a:spcBef>
-                <a:spcPts val="0"/>
-              </a:spcBef>
-              <a:spcAft>
-                <a:spcPts val="0"/>
-              </a:spcAft>
-              <a:buClr>
-                <a:schemeClr val="bg1">
-                  <a:lumMod val="50000"/>
-                </a:schemeClr>
-              </a:buClr>
-              <a:buSzPct val="100000"/>
-              <a:buFont typeface="Arial" panose="020B0604020202020204" pitchFamily="34" charset="0"/>
-              <a:buChar char="•"/>
-            </a:pPr>
-            <a:r>
-              <a:rPr lang="en-US" sz="2800" dirty="0">
-                <a:latin typeface="Helvetica Neue" panose="02000503000000020004" pitchFamily="2" charset="0"/>
-                <a:ea typeface="Helvetica Neue" panose="02000503000000020004" pitchFamily="2" charset="0"/>
-                <a:cs typeface="Helvetica Neue" panose="02000503000000020004" pitchFamily="2" charset="0"/>
-              </a:rPr>
-              <a:t>Conversion of photoelectrons to digital information occurs via an </a:t>
-            </a:r>
-            <a:r>
-              <a:rPr lang="en-US" sz="2800" b="1" i="1" dirty="0">
-                <a:latin typeface="Helvetica Neue" panose="02000503000000020004" pitchFamily="2" charset="0"/>
-                <a:ea typeface="Helvetica Neue" panose="02000503000000020004" pitchFamily="2" charset="0"/>
-                <a:cs typeface="Helvetica Neue" panose="02000503000000020004" pitchFamily="2" charset="0"/>
-              </a:rPr>
-              <a:t>analog-digital converter (ADC)</a:t>
-            </a:r>
-            <a:endParaRPr lang="en-US" sz="2800" dirty="0">
-              <a:latin typeface="Helvetica Neue" panose="02000503000000020004" pitchFamily="2" charset="0"/>
-              <a:ea typeface="Helvetica Neue" panose="02000503000000020004" pitchFamily="2" charset="0"/>
-              <a:cs typeface="Helvetica Neue" panose="02000503000000020004" pitchFamily="2" charset="0"/>
-            </a:endParaRPr>
-          </a:p>
-          <a:p>
-            <a:pPr fontAlgn="auto">
-              <a:spcBef>
-                <a:spcPts val="0"/>
-              </a:spcBef>
-              <a:spcAft>
-                <a:spcPts val="0"/>
-              </a:spcAft>
-              <a:buClr>
-                <a:schemeClr val="bg1">
-                  <a:lumMod val="50000"/>
-                </a:schemeClr>
-              </a:buClr>
-              <a:buSzPct val="100000"/>
-            </a:pPr>
-            <a:endParaRPr lang="en-US" sz="2800" dirty="0">
-              <a:latin typeface="Helvetica Neue" panose="02000503000000020004" pitchFamily="2" charset="0"/>
-              <a:ea typeface="Helvetica Neue" panose="02000503000000020004" pitchFamily="2" charset="0"/>
-              <a:cs typeface="Helvetica Neue" panose="02000503000000020004" pitchFamily="2" charset="0"/>
-            </a:endParaRPr>
-          </a:p>
-          <a:p>
-            <a:pPr marL="342900" indent="-342900" fontAlgn="auto">
-              <a:spcBef>
-                <a:spcPts val="0"/>
-              </a:spcBef>
-              <a:spcAft>
-                <a:spcPts val="0"/>
-              </a:spcAft>
-              <a:buClr>
-                <a:schemeClr val="bg1">
-                  <a:lumMod val="50000"/>
-                </a:schemeClr>
-              </a:buClr>
-              <a:buSzPct val="100000"/>
-              <a:buFont typeface="Arial" panose="020B0604020202020204" pitchFamily="34" charset="0"/>
-              <a:buChar char="•"/>
-            </a:pPr>
-            <a:r>
-              <a:rPr lang="en-US" sz="2800" dirty="0">
-                <a:latin typeface="Helvetica Neue" panose="02000503000000020004" pitchFamily="2" charset="0"/>
-                <a:ea typeface="Helvetica Neue" panose="02000503000000020004" pitchFamily="2" charset="0"/>
-                <a:cs typeface="Helvetica Neue" panose="02000503000000020004" pitchFamily="2" charset="0"/>
-              </a:rPr>
-              <a:t>Tradeoffs center around dynamic range and sensitivity</a:t>
-            </a:r>
-          </a:p>
-          <a:p>
-            <a:pPr marL="342900" indent="-342900" fontAlgn="auto">
-              <a:spcBef>
-                <a:spcPts val="0"/>
-              </a:spcBef>
-              <a:spcAft>
-                <a:spcPts val="0"/>
-              </a:spcAft>
-              <a:buClr>
-                <a:schemeClr val="bg1">
-                  <a:lumMod val="50000"/>
-                </a:schemeClr>
-              </a:buClr>
-              <a:buSzPct val="100000"/>
-              <a:buFont typeface="Arial" panose="020B0604020202020204" pitchFamily="34" charset="0"/>
-              <a:buChar char="•"/>
-            </a:pPr>
-            <a:endParaRPr lang="en-US" sz="2800" dirty="0">
-              <a:latin typeface="Helvetica Neue" panose="02000503000000020004" pitchFamily="2" charset="0"/>
-              <a:ea typeface="Helvetica Neue" panose="02000503000000020004" pitchFamily="2" charset="0"/>
-              <a:cs typeface="Helvetica Neue" panose="02000503000000020004" pitchFamily="2" charset="0"/>
-            </a:endParaRPr>
-          </a:p>
-          <a:p>
-            <a:pPr marL="342900" indent="-342900" fontAlgn="auto">
-              <a:spcBef>
-                <a:spcPts val="0"/>
-              </a:spcBef>
-              <a:spcAft>
-                <a:spcPts val="0"/>
-              </a:spcAft>
-              <a:buClr>
-                <a:schemeClr val="bg1">
-                  <a:lumMod val="50000"/>
-                </a:schemeClr>
-              </a:buClr>
-              <a:buSzPct val="100000"/>
-              <a:buFont typeface="Arial" panose="020B0604020202020204" pitchFamily="34" charset="0"/>
-              <a:buChar char="•"/>
-            </a:pPr>
-            <a:endParaRPr lang="en-US" sz="2800" dirty="0">
-              <a:latin typeface="Helvetica Neue" panose="02000503000000020004" pitchFamily="2" charset="0"/>
-              <a:ea typeface="Helvetica Neue" panose="02000503000000020004" pitchFamily="2" charset="0"/>
-              <a:cs typeface="Helvetica Neue" panose="02000503000000020004" pitchFamily="2" charset="0"/>
-            </a:endParaRPr>
+              <a:t>Spinning disc confocal</a:t>
+            </a:r>
           </a:p>
         </p:txBody>
       </p:sp>
@@ -13126,137 +13596,7 @@
                 </a:solidFill>
               </a:rPr>
               <a:pPr/>
-              <a:t>2</a:t>
-            </a:fld>
-            <a:endParaRPr lang="en-US" dirty="0">
-              <a:solidFill>
-                <a:prstClr val="black">
-                  <a:tint val="75000"/>
-                </a:prstClr>
-              </a:solidFill>
-            </a:endParaRPr>
-          </a:p>
-        </p:txBody>
-      </p:sp>
-    </p:spTree>
-    <p:extLst>
-      <p:ext uri="{BB962C8B-B14F-4D97-AF65-F5344CB8AC3E}">
-        <p14:creationId xmlns:p14="http://schemas.microsoft.com/office/powerpoint/2010/main" val="926296186"/>
-      </p:ext>
-    </p:extLst>
-  </p:cSld>
-  <p:clrMapOvr>
-    <a:masterClrMapping/>
-  </p:clrMapOvr>
-</p:sld>
-</file>
-
-<file path=ppt/slides/slide20.xml><?xml version="1.0" encoding="utf-8"?>
-<p:sld xmlns:a="http://schemas.openxmlformats.org/drawingml/2006/main" xmlns:r="http://schemas.openxmlformats.org/officeDocument/2006/relationships" xmlns:p="http://schemas.openxmlformats.org/presentationml/2006/main">
-  <p:cSld>
-    <p:spTree>
-      <p:nvGrpSpPr>
-        <p:cNvPr id="1" name=""/>
-        <p:cNvGrpSpPr/>
-        <p:nvPr/>
-      </p:nvGrpSpPr>
-      <p:grpSpPr>
-        <a:xfrm>
-          <a:off x="0" y="0"/>
-          <a:ext cx="0" cy="0"/>
-          <a:chOff x="0" y="0"/>
-          <a:chExt cx="0" cy="0"/>
-        </a:xfrm>
-      </p:grpSpPr>
-      <p:sp>
-        <p:nvSpPr>
-          <p:cNvPr id="4" name="Title 1"/>
-          <p:cNvSpPr txBox="1">
-            <a:spLocks/>
-          </p:cNvSpPr>
-          <p:nvPr/>
-        </p:nvSpPr>
-        <p:spPr>
-          <a:xfrm>
-            <a:off x="0" y="41589"/>
-            <a:ext cx="9144000" cy="1139825"/>
-          </a:xfrm>
-          <a:prstGeom prst="rect">
-            <a:avLst/>
-          </a:prstGeom>
-        </p:spPr>
-        <p:txBody>
-          <a:bodyPr vert="horz" lIns="91440" tIns="45720" rIns="91440" bIns="45720" rtlCol="0" anchor="ctr">
-            <a:normAutofit/>
-          </a:bodyPr>
-          <a:lstStyle>
-            <a:lvl1pPr algn="ctr" defTabSz="914400" rtl="0" eaLnBrk="1" latinLnBrk="0" hangingPunct="1">
-              <a:spcBef>
-                <a:spcPct val="0"/>
-              </a:spcBef>
-              <a:buNone/>
-              <a:defRPr sz="4400" kern="1200">
-                <a:solidFill>
-                  <a:schemeClr val="tx1"/>
-                </a:solidFill>
-                <a:latin typeface="+mj-lt"/>
-                <a:ea typeface="+mj-ea"/>
-                <a:cs typeface="+mj-cs"/>
-              </a:defRPr>
-            </a:lvl1pPr>
-          </a:lstStyle>
-          <a:p>
-            <a:pPr fontAlgn="auto">
-              <a:spcAft>
-                <a:spcPts val="0"/>
-              </a:spcAft>
-            </a:pPr>
-            <a:r>
-              <a:rPr lang="en-US" b="1" dirty="0">
-                <a:solidFill>
-                  <a:schemeClr val="tx1">
-                    <a:lumMod val="65000"/>
-                    <a:lumOff val="35000"/>
-                  </a:schemeClr>
-                </a:solidFill>
-                <a:latin typeface="Garamond" panose="02020404030301010803" pitchFamily="18" charset="0"/>
-              </a:rPr>
-              <a:t>Spinning disc confocal</a:t>
-            </a:r>
-          </a:p>
-        </p:txBody>
-      </p:sp>
-      <p:sp>
-        <p:nvSpPr>
-          <p:cNvPr id="2" name="Slide Number Placeholder 1">
-            <a:extLst>
-              <a:ext uri="{FF2B5EF4-FFF2-40B4-BE49-F238E27FC236}">
-                <a16:creationId xmlns:a16="http://schemas.microsoft.com/office/drawing/2014/main" id="{A67DA90B-656D-8349-8950-078AABAE1757}"/>
-              </a:ext>
-            </a:extLst>
-          </p:cNvPr>
-          <p:cNvSpPr>
-            <a:spLocks noGrp="1"/>
-          </p:cNvSpPr>
-          <p:nvPr>
-            <p:ph type="sldNum" sz="quarter" idx="12"/>
-          </p:nvPr>
-        </p:nvSpPr>
-        <p:spPr/>
-        <p:txBody>
-          <a:bodyPr/>
-          <a:lstStyle/>
-          <a:p>
-            <a:fld id="{1D3114E9-4222-4A72-8713-D3519DB6E1E0}" type="slidenum">
-              <a:rPr lang="en-US" smtClean="0">
-                <a:solidFill>
-                  <a:prstClr val="black">
-                    <a:tint val="75000"/>
-                  </a:prstClr>
-                </a:solidFill>
-              </a:rPr>
-              <a:pPr/>
-              <a:t>20</a:t>
+              <a:t>21</a:t>
             </a:fld>
             <a:endParaRPr lang="en-US">
               <a:solidFill>
@@ -13686,7 +14026,7 @@
 </p:sld>
 </file>
 
-<file path=ppt/slides/slide21.xml><?xml version="1.0" encoding="utf-8"?>
+<file path=ppt/slides/slide22.xml><?xml version="1.0" encoding="utf-8"?>
 <p:sld xmlns:a="http://schemas.openxmlformats.org/drawingml/2006/main" xmlns:r="http://schemas.openxmlformats.org/officeDocument/2006/relationships" xmlns:p="http://schemas.openxmlformats.org/presentationml/2006/main">
   <p:cSld>
     <p:spTree>
@@ -13791,7 +14131,7 @@
                 </a:solidFill>
               </a:rPr>
               <a:pPr/>
-              <a:t>21</a:t>
+              <a:t>22</a:t>
             </a:fld>
             <a:endParaRPr lang="en-US">
               <a:solidFill>
@@ -14129,7 +14469,7 @@
 </p:sld>
 </file>
 
-<file path=ppt/slides/slide22.xml><?xml version="1.0" encoding="utf-8"?>
+<file path=ppt/slides/slide23.xml><?xml version="1.0" encoding="utf-8"?>
 <p:sld xmlns:a="http://schemas.openxmlformats.org/drawingml/2006/main" xmlns:r="http://schemas.openxmlformats.org/officeDocument/2006/relationships" xmlns:p="http://schemas.openxmlformats.org/presentationml/2006/main">
   <p:cSld>
     <p:spTree>
@@ -14234,7 +14574,7 @@
                 </a:solidFill>
               </a:rPr>
               <a:pPr/>
-              <a:t>22</a:t>
+              <a:t>23</a:t>
             </a:fld>
             <a:endParaRPr lang="en-US">
               <a:solidFill>
@@ -14572,7 +14912,7 @@
 </p:sld>
 </file>
 
-<file path=ppt/slides/slide23.xml><?xml version="1.0" encoding="utf-8"?>
+<file path=ppt/slides/slide24.xml><?xml version="1.0" encoding="utf-8"?>
 <p:sld xmlns:a="http://schemas.openxmlformats.org/drawingml/2006/main" xmlns:r="http://schemas.openxmlformats.org/officeDocument/2006/relationships" xmlns:p="http://schemas.openxmlformats.org/presentationml/2006/main">
   <p:cSld>
     <p:spTree>
@@ -14677,7 +15017,7 @@
                 </a:solidFill>
               </a:rPr>
               <a:pPr/>
-              <a:t>23</a:t>
+              <a:t>24</a:t>
             </a:fld>
             <a:endParaRPr lang="en-US">
               <a:solidFill>

</xml_diff>